<commit_message>
NestedDictSoln for activity 1
</commit_message>
<xml_diff>
--- a/01-Excel/1/Supplimental Files/DataScience.pptx
+++ b/01-Excel/1/Supplimental Files/DataScience.pptx
@@ -104,6 +104,11 @@
       </a:defRPr>
     </a:lvl9pPr>
   </p:defaultTextStyle>
+  <p:extLst>
+    <p:ext uri="{EFAFB233-063F-42B5-8137-9DF3F51BA10A}">
+      <p15:sldGuideLst xmlns:p15="http://schemas.microsoft.com/office/powerpoint/2012/main"/>
+    </p:ext>
+  </p:extLst>
 </p:presentation>
 </file>
 
@@ -4056,7 +4061,7 @@
           <a:p>
             <a:fld id="{A45B1431-51D5-B949-8C68-743525E722A6}" type="datetimeFigureOut">
               <a:rPr lang="en-US" smtClean="0"/>
-              <a:t>3/6/19</a:t>
+              <a:t>7/11/19</a:t>
             </a:fld>
             <a:endParaRPr lang="en-US"/>
           </a:p>
@@ -4254,7 +4259,7 @@
           <a:p>
             <a:fld id="{A45B1431-51D5-B949-8C68-743525E722A6}" type="datetimeFigureOut">
               <a:rPr lang="en-US" smtClean="0"/>
-              <a:t>3/6/19</a:t>
+              <a:t>7/11/19</a:t>
             </a:fld>
             <a:endParaRPr lang="en-US"/>
           </a:p>
@@ -4462,7 +4467,7 @@
           <a:p>
             <a:fld id="{A45B1431-51D5-B949-8C68-743525E722A6}" type="datetimeFigureOut">
               <a:rPr lang="en-US" smtClean="0"/>
-              <a:t>3/6/19</a:t>
+              <a:t>7/11/19</a:t>
             </a:fld>
             <a:endParaRPr lang="en-US"/>
           </a:p>
@@ -4660,7 +4665,7 @@
           <a:p>
             <a:fld id="{A45B1431-51D5-B949-8C68-743525E722A6}" type="datetimeFigureOut">
               <a:rPr lang="en-US" smtClean="0"/>
-              <a:t>3/6/19</a:t>
+              <a:t>7/11/19</a:t>
             </a:fld>
             <a:endParaRPr lang="en-US"/>
           </a:p>
@@ -4935,7 +4940,7 @@
           <a:p>
             <a:fld id="{A45B1431-51D5-B949-8C68-743525E722A6}" type="datetimeFigureOut">
               <a:rPr lang="en-US" smtClean="0"/>
-              <a:t>3/6/19</a:t>
+              <a:t>7/11/19</a:t>
             </a:fld>
             <a:endParaRPr lang="en-US"/>
           </a:p>
@@ -5200,7 +5205,7 @@
           <a:p>
             <a:fld id="{A45B1431-51D5-B949-8C68-743525E722A6}" type="datetimeFigureOut">
               <a:rPr lang="en-US" smtClean="0"/>
-              <a:t>3/6/19</a:t>
+              <a:t>7/11/19</a:t>
             </a:fld>
             <a:endParaRPr lang="en-US"/>
           </a:p>
@@ -5612,7 +5617,7 @@
           <a:p>
             <a:fld id="{A45B1431-51D5-B949-8C68-743525E722A6}" type="datetimeFigureOut">
               <a:rPr lang="en-US" smtClean="0"/>
-              <a:t>3/6/19</a:t>
+              <a:t>7/11/19</a:t>
             </a:fld>
             <a:endParaRPr lang="en-US"/>
           </a:p>
@@ -5753,7 +5758,7 @@
           <a:p>
             <a:fld id="{A45B1431-51D5-B949-8C68-743525E722A6}" type="datetimeFigureOut">
               <a:rPr lang="en-US" smtClean="0"/>
-              <a:t>3/6/19</a:t>
+              <a:t>7/11/19</a:t>
             </a:fld>
             <a:endParaRPr lang="en-US"/>
           </a:p>
@@ -5866,7 +5871,7 @@
           <a:p>
             <a:fld id="{A45B1431-51D5-B949-8C68-743525E722A6}" type="datetimeFigureOut">
               <a:rPr lang="en-US" smtClean="0"/>
-              <a:t>3/6/19</a:t>
+              <a:t>7/11/19</a:t>
             </a:fld>
             <a:endParaRPr lang="en-US"/>
           </a:p>
@@ -6177,7 +6182,7 @@
           <a:p>
             <a:fld id="{A45B1431-51D5-B949-8C68-743525E722A6}" type="datetimeFigureOut">
               <a:rPr lang="en-US" smtClean="0"/>
-              <a:t>3/6/19</a:t>
+              <a:t>7/11/19</a:t>
             </a:fld>
             <a:endParaRPr lang="en-US"/>
           </a:p>
@@ -6465,7 +6470,7 @@
           <a:p>
             <a:fld id="{A45B1431-51D5-B949-8C68-743525E722A6}" type="datetimeFigureOut">
               <a:rPr lang="en-US" smtClean="0"/>
-              <a:t>3/6/19</a:t>
+              <a:t>7/11/19</a:t>
             </a:fld>
             <a:endParaRPr lang="en-US"/>
           </a:p>
@@ -6706,7 +6711,7 @@
           <a:p>
             <a:fld id="{A45B1431-51D5-B949-8C68-743525E722A6}" type="datetimeFigureOut">
               <a:rPr lang="en-US" smtClean="0"/>
-              <a:t>3/6/19</a:t>
+              <a:t>7/11/19</a:t>
             </a:fld>
             <a:endParaRPr lang="en-US"/>
           </a:p>
@@ -7480,7 +7485,7 @@
                     <p:nvPr>
                       <p:extLst>
                         <p:ext uri="{D42A27DB-BD31-4B8C-83A1-F6EECF244321}">
-                          <p14:modId xmlns:p14="http://schemas.microsoft.com/office/powerpoint/2010/main" val="3546008946"/>
+                          <p14:modId xmlns:p14="http://schemas.microsoft.com/office/powerpoint/2010/main" val="138840866"/>
                         </p:ext>
                       </p:extLst>
                     </p:nvPr>
@@ -7801,6 +7806,220 @@
           </p:spPr>
         </p:pic>
       </p:grpSp>
+      <p:sp>
+        <p:nvSpPr>
+          <p:cNvPr id="2" name="Rectangle 1">
+            <a:extLst>
+              <a:ext uri="{FF2B5EF4-FFF2-40B4-BE49-F238E27FC236}">
+                <a16:creationId xmlns:a16="http://schemas.microsoft.com/office/drawing/2014/main" id="{021A9723-D5A3-9748-905A-9CF3AA940E7B}"/>
+              </a:ext>
+            </a:extLst>
+          </p:cNvPr>
+          <p:cNvSpPr/>
+          <p:nvPr/>
+        </p:nvSpPr>
+        <p:spPr>
+          <a:xfrm>
+            <a:off x="2251710" y="11018"/>
+            <a:ext cx="3844290" cy="3375740"/>
+          </a:xfrm>
+          <a:prstGeom prst="rect">
+            <a:avLst/>
+          </a:prstGeom>
+          <a:noFill/>
+        </p:spPr>
+        <p:style>
+          <a:lnRef idx="2">
+            <a:schemeClr val="accent1">
+              <a:shade val="50000"/>
+            </a:schemeClr>
+          </a:lnRef>
+          <a:fillRef idx="1">
+            <a:schemeClr val="accent1"/>
+          </a:fillRef>
+          <a:effectRef idx="0">
+            <a:schemeClr val="accent1"/>
+          </a:effectRef>
+          <a:fontRef idx="minor">
+            <a:schemeClr val="lt1"/>
+          </a:fontRef>
+        </p:style>
+        <p:txBody>
+          <a:bodyPr rtlCol="0" anchor="t"/>
+          <a:lstStyle/>
+          <a:p>
+            <a:r>
+              <a:rPr lang="en-US" dirty="0">
+                <a:solidFill>
+                  <a:schemeClr val="tx1"/>
+                </a:solidFill>
+              </a:rPr>
+              <a:t>Data Engineer</a:t>
+            </a:r>
+          </a:p>
+        </p:txBody>
+      </p:sp>
+      <p:sp>
+        <p:nvSpPr>
+          <p:cNvPr id="21" name="Rectangle 20">
+            <a:extLst>
+              <a:ext uri="{FF2B5EF4-FFF2-40B4-BE49-F238E27FC236}">
+                <a16:creationId xmlns:a16="http://schemas.microsoft.com/office/drawing/2014/main" id="{68680255-730E-3A4A-B66B-E1537D262722}"/>
+              </a:ext>
+            </a:extLst>
+          </p:cNvPr>
+          <p:cNvSpPr/>
+          <p:nvPr/>
+        </p:nvSpPr>
+        <p:spPr>
+          <a:xfrm>
+            <a:off x="6343116" y="35182"/>
+            <a:ext cx="3844290" cy="3375740"/>
+          </a:xfrm>
+          <a:prstGeom prst="rect">
+            <a:avLst/>
+          </a:prstGeom>
+          <a:noFill/>
+        </p:spPr>
+        <p:style>
+          <a:lnRef idx="2">
+            <a:schemeClr val="accent1">
+              <a:shade val="50000"/>
+            </a:schemeClr>
+          </a:lnRef>
+          <a:fillRef idx="1">
+            <a:schemeClr val="accent1"/>
+          </a:fillRef>
+          <a:effectRef idx="0">
+            <a:schemeClr val="accent1"/>
+          </a:effectRef>
+          <a:fontRef idx="minor">
+            <a:schemeClr val="lt1"/>
+          </a:fontRef>
+        </p:style>
+        <p:txBody>
+          <a:bodyPr rtlCol="0" anchor="t"/>
+          <a:lstStyle/>
+          <a:p>
+            <a:pPr algn="r"/>
+            <a:r>
+              <a:rPr lang="en-US" dirty="0">
+                <a:solidFill>
+                  <a:schemeClr val="tx1"/>
+                </a:solidFill>
+              </a:rPr>
+              <a:t>API Engineer</a:t>
+            </a:r>
+          </a:p>
+        </p:txBody>
+      </p:sp>
+      <p:sp>
+        <p:nvSpPr>
+          <p:cNvPr id="22" name="Rectangle 21">
+            <a:extLst>
+              <a:ext uri="{FF2B5EF4-FFF2-40B4-BE49-F238E27FC236}">
+                <a16:creationId xmlns:a16="http://schemas.microsoft.com/office/drawing/2014/main" id="{6F7B79E1-F872-9F4D-A61F-136EC5F13C6F}"/>
+              </a:ext>
+            </a:extLst>
+          </p:cNvPr>
+          <p:cNvSpPr/>
+          <p:nvPr/>
+        </p:nvSpPr>
+        <p:spPr>
+          <a:xfrm>
+            <a:off x="2251710" y="3453386"/>
+            <a:ext cx="3844290" cy="3375740"/>
+          </a:xfrm>
+          <a:prstGeom prst="rect">
+            <a:avLst/>
+          </a:prstGeom>
+          <a:noFill/>
+        </p:spPr>
+        <p:style>
+          <a:lnRef idx="2">
+            <a:schemeClr val="accent1">
+              <a:shade val="50000"/>
+            </a:schemeClr>
+          </a:lnRef>
+          <a:fillRef idx="1">
+            <a:schemeClr val="accent1"/>
+          </a:fillRef>
+          <a:effectRef idx="0">
+            <a:schemeClr val="accent1"/>
+          </a:effectRef>
+          <a:fontRef idx="minor">
+            <a:schemeClr val="lt1"/>
+          </a:fontRef>
+        </p:style>
+        <p:txBody>
+          <a:bodyPr rtlCol="0" anchor="b"/>
+          <a:lstStyle/>
+          <a:p>
+            <a:r>
+              <a:rPr lang="en-US" dirty="0">
+                <a:solidFill>
+                  <a:schemeClr val="tx1"/>
+                </a:solidFill>
+              </a:rPr>
+              <a:t>Analytics Engineer</a:t>
+            </a:r>
+          </a:p>
+        </p:txBody>
+      </p:sp>
+      <p:sp>
+        <p:nvSpPr>
+          <p:cNvPr id="23" name="Rectangle 22">
+            <a:extLst>
+              <a:ext uri="{FF2B5EF4-FFF2-40B4-BE49-F238E27FC236}">
+                <a16:creationId xmlns:a16="http://schemas.microsoft.com/office/drawing/2014/main" id="{48183D08-DBA0-8545-9631-548B3B2BDE23}"/>
+              </a:ext>
+            </a:extLst>
+          </p:cNvPr>
+          <p:cNvSpPr/>
+          <p:nvPr/>
+        </p:nvSpPr>
+        <p:spPr>
+          <a:xfrm>
+            <a:off x="6343116" y="3482260"/>
+            <a:ext cx="3844290" cy="3375740"/>
+          </a:xfrm>
+          <a:prstGeom prst="rect">
+            <a:avLst/>
+          </a:prstGeom>
+          <a:noFill/>
+        </p:spPr>
+        <p:style>
+          <a:lnRef idx="2">
+            <a:schemeClr val="accent1">
+              <a:shade val="50000"/>
+            </a:schemeClr>
+          </a:lnRef>
+          <a:fillRef idx="1">
+            <a:schemeClr val="accent1"/>
+          </a:fillRef>
+          <a:effectRef idx="0">
+            <a:schemeClr val="accent1"/>
+          </a:effectRef>
+          <a:fontRef idx="minor">
+            <a:schemeClr val="lt1"/>
+          </a:fontRef>
+        </p:style>
+        <p:txBody>
+          <a:bodyPr rtlCol="0" anchor="b"/>
+          <a:lstStyle/>
+          <a:p>
+            <a:pPr algn="r"/>
+            <a:r>
+              <a:rPr lang="en-US" dirty="0">
+                <a:solidFill>
+                  <a:schemeClr val="tx1"/>
+                </a:solidFill>
+              </a:rPr>
+              <a:t>Visualization Engineer</a:t>
+            </a:r>
+          </a:p>
+        </p:txBody>
+      </p:sp>
     </p:spTree>
     <p:extLst>
       <p:ext uri="{BB962C8B-B14F-4D97-AF65-F5344CB8AC3E}">

</xml_diff>